<commit_message>
modify final presentation for Honors Seminar
</commit_message>
<xml_diff>
--- a/Ship Final Presentation - Digital Music Composition using Genetic Algorithms.pptx
+++ b/Ship Final Presentation - Digital Music Composition using Genetic Algorithms.pptx
@@ -205,7 +205,7 @@
           <a:p>
             <a:fld id="{40BC42F4-E0F0-4C52-9DCD-A716B8FE5D15}" type="datetimeFigureOut">
               <a:rPr lang="en-US" smtClean="0"/>
-              <a:t>4/21/2014</a:t>
+              <a:t>4/22/2014</a:t>
             </a:fld>
             <a:endParaRPr lang="en-US"/>
           </a:p>
@@ -521,7 +521,7 @@
           <a:p>
             <a:fld id="{40BC42F4-E0F0-4C52-9DCD-A716B8FE5D15}" type="datetimeFigureOut">
               <a:rPr lang="en-US" smtClean="0"/>
-              <a:t>4/21/2014</a:t>
+              <a:t>4/22/2014</a:t>
             </a:fld>
             <a:endParaRPr lang="en-US"/>
           </a:p>
@@ -696,7 +696,7 @@
           <a:p>
             <a:fld id="{40BC42F4-E0F0-4C52-9DCD-A716B8FE5D15}" type="datetimeFigureOut">
               <a:rPr lang="en-US" smtClean="0"/>
-              <a:t>4/21/2014</a:t>
+              <a:t>4/22/2014</a:t>
             </a:fld>
             <a:endParaRPr lang="en-US"/>
           </a:p>
@@ -814,7 +814,7 @@
           <a:p>
             <a:fld id="{40BC42F4-E0F0-4C52-9DCD-A716B8FE5D15}" type="datetimeFigureOut">
               <a:rPr lang="en-US" smtClean="0"/>
-              <a:t>4/21/2014</a:t>
+              <a:t>4/22/2014</a:t>
             </a:fld>
             <a:endParaRPr lang="en-US"/>
           </a:p>
@@ -1112,7 +1112,7 @@
           <a:p>
             <a:fld id="{40BC42F4-E0F0-4C52-9DCD-A716B8FE5D15}" type="datetimeFigureOut">
               <a:rPr lang="en-US" smtClean="0"/>
-              <a:t>4/21/2014</a:t>
+              <a:t>4/22/2014</a:t>
             </a:fld>
             <a:endParaRPr lang="en-US"/>
           </a:p>
@@ -1405,7 +1405,7 @@
           <a:p>
             <a:fld id="{40BC42F4-E0F0-4C52-9DCD-A716B8FE5D15}" type="datetimeFigureOut">
               <a:rPr lang="en-US" smtClean="0"/>
-              <a:t>4/21/2014</a:t>
+              <a:t>4/22/2014</a:t>
             </a:fld>
             <a:endParaRPr lang="en-US"/>
           </a:p>
@@ -1833,7 +1833,7 @@
           <a:p>
             <a:fld id="{40BC42F4-E0F0-4C52-9DCD-A716B8FE5D15}" type="datetimeFigureOut">
               <a:rPr lang="en-US" smtClean="0"/>
-              <a:t>4/21/2014</a:t>
+              <a:t>4/22/2014</a:t>
             </a:fld>
             <a:endParaRPr lang="en-US"/>
           </a:p>
@@ -1951,7 +1951,7 @@
           <a:p>
             <a:fld id="{40BC42F4-E0F0-4C52-9DCD-A716B8FE5D15}" type="datetimeFigureOut">
               <a:rPr lang="en-US" smtClean="0"/>
-              <a:t>4/21/2014</a:t>
+              <a:t>4/22/2014</a:t>
             </a:fld>
             <a:endParaRPr lang="en-US"/>
           </a:p>
@@ -2041,7 +2041,7 @@
           <a:p>
             <a:fld id="{40BC42F4-E0F0-4C52-9DCD-A716B8FE5D15}" type="datetimeFigureOut">
               <a:rPr lang="en-US" smtClean="0"/>
-              <a:t>4/21/2014</a:t>
+              <a:t>4/22/2014</a:t>
             </a:fld>
             <a:endParaRPr lang="en-US"/>
           </a:p>
@@ -2291,7 +2291,7 @@
           <a:p>
             <a:fld id="{40BC42F4-E0F0-4C52-9DCD-A716B8FE5D15}" type="datetimeFigureOut">
               <a:rPr lang="en-US" smtClean="0"/>
-              <a:t>4/21/2014</a:t>
+              <a:t>4/22/2014</a:t>
             </a:fld>
             <a:endParaRPr lang="en-US"/>
           </a:p>
@@ -2807,7 +2807,7 @@
           <a:p>
             <a:fld id="{40BC42F4-E0F0-4C52-9DCD-A716B8FE5D15}" type="datetimeFigureOut">
               <a:rPr lang="en-US" smtClean="0"/>
-              <a:t>4/21/2014</a:t>
+              <a:t>4/22/2014</a:t>
             </a:fld>
             <a:endParaRPr lang="en-US"/>
           </a:p>
@@ -3037,7 +3037,7 @@
           <a:p>
             <a:fld id="{40BC42F4-E0F0-4C52-9DCD-A716B8FE5D15}" type="datetimeFigureOut">
               <a:rPr lang="en-US" smtClean="0"/>
-              <a:t>4/21/2014</a:t>
+              <a:t>4/22/2014</a:t>
             </a:fld>
             <a:endParaRPr lang="en-US"/>
           </a:p>
@@ -3568,7 +3568,17 @@
           <a:p>
             <a:r>
               <a:rPr lang="en-US" dirty="0" smtClean="0"/>
-              <a:t>Mentor: Dr. Alice Armstrong</a:t>
+              <a:t>Mentor: Dr. Alice </a:t>
+            </a:r>
+            <a:r>
+              <a:rPr lang="en-US" dirty="0" smtClean="0"/>
+              <a:t>Armstrong</a:t>
+            </a:r>
+          </a:p>
+          <a:p>
+            <a:r>
+              <a:rPr lang="en-US" smtClean="0"/>
+              <a:t>Gihub.com/sb8244/GeneticMusicComposition</a:t>
             </a:r>
             <a:endParaRPr lang="en-US" dirty="0"/>
           </a:p>

</xml_diff>